<commit_message>
Updated after Lab 3
</commit_message>
<xml_diff>
--- a/data8/slides/lab3.pptx
+++ b/data8/slides/lab3.pptx
@@ -211,7 +211,7 @@
           <a:p>
             <a:fld id="{97CB1905-1EEB-6545-B5E2-B70E8868255E}" type="datetimeFigureOut">
               <a:rPr lang="en-US" smtClean="0"/>
-              <a:t>9/2/2019</a:t>
+              <a:t>9/13/2019</a:t>
             </a:fld>
             <a:endParaRPr lang="en-US"/>
           </a:p>
@@ -377,7 +377,7 @@
           <a:p>
             <a:fld id="{5F53F6BF-7462-9046-A2B6-90C29244BD27}" type="datetimeFigureOut">
               <a:rPr lang="en-US" smtClean="0"/>
-              <a:t>9/2/2019</a:t>
+              <a:t>9/13/2019</a:t>
             </a:fld>
             <a:endParaRPr lang="en-US"/>
           </a:p>
@@ -8575,6 +8575,59 @@
           <a:bodyPr/>
           <a:lstStyle/>
           <a:p>
+            <a:r>
+              <a:rPr lang="en-CA" dirty="0" smtClean="0">
+                <a:latin typeface="+mn-lt"/>
+              </a:rPr>
+              <a:t>Midterm is Friday 10/18</a:t>
+            </a:r>
+          </a:p>
+          <a:p>
+            <a:r>
+              <a:rPr lang="en-CA" dirty="0" smtClean="0">
+                <a:latin typeface="+mn-lt"/>
+              </a:rPr>
+              <a:t>Final is Monday 12/16</a:t>
+            </a:r>
+          </a:p>
+          <a:p>
+            <a:r>
+              <a:rPr lang="en-CA" dirty="0" smtClean="0">
+                <a:latin typeface="+mn-lt"/>
+              </a:rPr>
+              <a:t>No alternate exams</a:t>
+            </a:r>
+          </a:p>
+          <a:p>
+            <a:r>
+              <a:rPr lang="en-CA" dirty="0" smtClean="0">
+                <a:latin typeface="+mn-lt"/>
+              </a:rPr>
+              <a:t>Grades released weekly on Fridays</a:t>
+            </a:r>
+          </a:p>
+          <a:p>
+            <a:r>
+              <a:rPr lang="en-CA" dirty="0" smtClean="0">
+                <a:latin typeface="+mn-lt"/>
+              </a:rPr>
+              <a:t>For free response questions, submit regrade request on Gradescope </a:t>
+            </a:r>
+          </a:p>
+          <a:p>
+            <a:pPr lvl="1"/>
+            <a:r>
+              <a:rPr lang="en-CA" dirty="0" smtClean="0">
+                <a:latin typeface="+mn-lt"/>
+              </a:rPr>
+              <a:t>1 week to submit </a:t>
+            </a:r>
+            <a:r>
+              <a:rPr lang="en-CA" smtClean="0">
+                <a:latin typeface="+mn-lt"/>
+              </a:rPr>
+              <a:t>regrade requests</a:t>
+            </a:r>
             <a:endParaRPr lang="en-CA" dirty="0">
               <a:latin typeface="+mn-lt"/>
             </a:endParaRPr>

</xml_diff>